<commit_message>
added road map slide
</commit_message>
<xml_diff>
--- a/Presentations/sssi_aaac.pptx
+++ b/Presentations/sssi_aaac.pptx
@@ -6,6 +6,7 @@
   </p:sldMasterIdLst>
   <p:sldIdLst>
     <p:sldId id="257" r:id="rId2"/>
+    <p:sldId id="258" r:id="rId3"/>
   </p:sldIdLst>
   <p:sldSz cx="9144000" cy="6858000" type="screen4x3"/>
   <p:notesSz cx="6858000" cy="9144000"/>
@@ -3191,11 +3192,19 @@
             </a:r>
             <a:r>
               <a:rPr lang="en-US" sz="2400" dirty="0"/>
-              <a:t>capabilities matched to LSST and CMB-</a:t>
+              <a:t>capabilities </a:t>
+            </a:r>
+            <a:r>
+              <a:rPr lang="en-US" sz="2400" u="sng" dirty="0"/>
+              <a:t>matched to LSST and CMB-</a:t>
+            </a:r>
+            <a:r>
+              <a:rPr lang="en-US" sz="2400" u="sng" dirty="0" smtClean="0"/>
+              <a:t>S4 survey areas and depths</a:t>
             </a:r>
             <a:r>
               <a:rPr lang="en-US" sz="2400" dirty="0" smtClean="0"/>
-              <a:t>S4 survey areas and depths; Southern site preferable</a:t>
+              <a:t>; Southern site preferable</a:t>
             </a:r>
           </a:p>
           <a:p>
@@ -3281,6 +3290,175 @@
     <p:extLst>
       <p:ext uri="{BB962C8B-B14F-4D97-AF65-F5344CB8AC3E}">
         <p14:creationId xmlns:p14="http://schemas.microsoft.com/office/powerpoint/2010/main" val="768141982"/>
+      </p:ext>
+    </p:extLst>
+  </p:cSld>
+  <p:clrMapOvr>
+    <a:masterClrMapping/>
+  </p:clrMapOvr>
+  <p:timing>
+    <p:tnLst>
+      <p:par>
+        <p:cTn xmlns:p14="http://schemas.microsoft.com/office/powerpoint/2010/main" id="1" dur="indefinite" restart="never" nodeType="tmRoot"/>
+      </p:par>
+    </p:tnLst>
+  </p:timing>
+</p:sld>
+</file>
+
+<file path=ppt/slides/slide2.xml><?xml version="1.0" encoding="utf-8"?>
+<p:sld xmlns:a="http://schemas.openxmlformats.org/drawingml/2006/main" xmlns:r="http://schemas.openxmlformats.org/officeDocument/2006/relationships" xmlns:p="http://schemas.openxmlformats.org/presentationml/2006/main">
+  <p:cSld>
+    <p:spTree>
+      <p:nvGrpSpPr>
+        <p:cNvPr id="1" name=""/>
+        <p:cNvGrpSpPr/>
+        <p:nvPr/>
+      </p:nvGrpSpPr>
+      <p:grpSpPr>
+        <a:xfrm>
+          <a:off x="0" y="0"/>
+          <a:ext cx="0" cy="0"/>
+          <a:chOff x="0" y="0"/>
+          <a:chExt cx="0" cy="0"/>
+        </a:xfrm>
+      </p:grpSpPr>
+      <p:sp>
+        <p:nvSpPr>
+          <p:cNvPr id="2" name="Title 1"/>
+          <p:cNvSpPr>
+            <a:spLocks noGrp="1"/>
+          </p:cNvSpPr>
+          <p:nvPr>
+            <p:ph type="title"/>
+          </p:nvPr>
+        </p:nvSpPr>
+        <p:spPr>
+          <a:xfrm>
+            <a:off x="457200" y="0"/>
+            <a:ext cx="8229600" cy="705076"/>
+          </a:xfrm>
+        </p:spPr>
+        <p:txBody>
+          <a:bodyPr>
+            <a:normAutofit/>
+          </a:bodyPr>
+          <a:lstStyle/>
+          <a:p>
+            <a:r>
+              <a:rPr lang="en-US" sz="3200" dirty="0" smtClean="0"/>
+              <a:t>Road Map for Spectroscopy</a:t>
+            </a:r>
+            <a:endParaRPr lang="en-US" sz="3200" dirty="0"/>
+          </a:p>
+        </p:txBody>
+      </p:sp>
+      <p:sp>
+        <p:nvSpPr>
+          <p:cNvPr id="3" name="Content Placeholder 2"/>
+          <p:cNvSpPr>
+            <a:spLocks noGrp="1"/>
+          </p:cNvSpPr>
+          <p:nvPr>
+            <p:ph idx="1"/>
+          </p:nvPr>
+        </p:nvSpPr>
+        <p:spPr>
+          <a:xfrm>
+            <a:off x="146755" y="651127"/>
+            <a:ext cx="8700912" cy="6150429"/>
+          </a:xfrm>
+        </p:spPr>
+        <p:txBody>
+          <a:bodyPr>
+            <a:normAutofit/>
+          </a:bodyPr>
+          <a:lstStyle/>
+          <a:p>
+            <a:r>
+              <a:rPr lang="en-US" sz="2400" dirty="0" smtClean="0"/>
+              <a:t>The proposed spectroscopic surveys build on each other directly</a:t>
+            </a:r>
+          </a:p>
+          <a:p>
+            <a:r>
+              <a:rPr lang="en-US" sz="2400" dirty="0" smtClean="0"/>
+              <a:t>DESI-2 would be relatively low in cost and could follow DESI immediately in 2024</a:t>
+            </a:r>
+          </a:p>
+          <a:p>
+            <a:pPr lvl="1"/>
+            <a:r>
+              <a:rPr lang="en-US" sz="2400" dirty="0" smtClean="0"/>
+              <a:t>Spectrograph upgrades to add IR arm would enhance capabilities at higher redshifts</a:t>
+            </a:r>
+          </a:p>
+          <a:p>
+            <a:pPr lvl="1"/>
+            <a:r>
+              <a:rPr lang="en-US" sz="2400" dirty="0" smtClean="0"/>
+              <a:t>Moving to Blanco is an option, increasing LSST overlap </a:t>
+            </a:r>
+          </a:p>
+          <a:p>
+            <a:r>
+              <a:rPr lang="en-US" sz="2400" dirty="0" smtClean="0"/>
+              <a:t>SSSI could reuse DESI spectrographs to reduce costs</a:t>
+            </a:r>
+          </a:p>
+          <a:p>
+            <a:pPr lvl="1"/>
+            <a:r>
+              <a:rPr lang="en-US" sz="2400" dirty="0" smtClean="0"/>
+              <a:t>Earliest possible deployment c. 2026</a:t>
+            </a:r>
+          </a:p>
+          <a:p>
+            <a:pPr lvl="1"/>
+            <a:r>
+              <a:rPr lang="en-US" sz="2400" dirty="0" smtClean="0"/>
+              <a:t>Most efficient option would be to deploy on 11-12m telescope (e.g. MSE or European wide-field concepts) </a:t>
+            </a:r>
+          </a:p>
+          <a:p>
+            <a:r>
+              <a:rPr lang="en-US" sz="2400" dirty="0" smtClean="0"/>
+              <a:t>BOA would require both a &gt;10m wide-field telescope and significant hardware R&amp;D</a:t>
+            </a:r>
+            <a:endParaRPr lang="en-US" sz="2400" dirty="0"/>
+          </a:p>
+          <a:p>
+            <a:pPr lvl="1"/>
+            <a:r>
+              <a:rPr lang="en-US" sz="2400" dirty="0"/>
+              <a:t>Earliest possible deployment </a:t>
+            </a:r>
+            <a:r>
+              <a:rPr lang="en-US" sz="2400" dirty="0" smtClean="0"/>
+              <a:t>early 2030s</a:t>
+            </a:r>
+          </a:p>
+          <a:p>
+            <a:pPr lvl="1"/>
+            <a:r>
+              <a:rPr lang="en-US" sz="2400" dirty="0" smtClean="0"/>
+              <a:t>Could utilize telescope originally developed for SSSI</a:t>
+            </a:r>
+            <a:endParaRPr lang="en-US" sz="2400" dirty="0"/>
+          </a:p>
+          <a:p>
+            <a:pPr lvl="1"/>
+            <a:endParaRPr lang="en-US" sz="2400" dirty="0"/>
+          </a:p>
+          <a:p>
+            <a:endParaRPr lang="en-US" sz="2400" dirty="0"/>
+          </a:p>
+        </p:txBody>
+      </p:sp>
+    </p:spTree>
+    <p:extLst>
+      <p:ext uri="{BB962C8B-B14F-4D97-AF65-F5344CB8AC3E}">
+        <p14:creationId xmlns:p14="http://schemas.microsoft.com/office/powerpoint/2010/main" val="210505907"/>
       </p:ext>
     </p:extLst>
   </p:cSld>

</xml_diff>